<commit_message>
Feat (chp8): Initiailisation du chapitre 8
Préparation du contenu du chapitre 8 sur les chaines de caractères.
</commit_message>
<xml_diff>
--- a/source/Chapitre x - x.pptx
+++ b/source/Chapitre x - x.pptx
@@ -118,16 +118,47 @@
 </p:presentation>
 </file>
 
-<file path=ppt/revisionInfo.xml><?xml version="1.0" encoding="utf-8"?>
-<p1510:revInfo xmlns:a="http://schemas.openxmlformats.org/drawingml/2006/main" xmlns:r="http://schemas.openxmlformats.org/officeDocument/2006/relationships" xmlns:p1510="http://schemas.microsoft.com/office/powerpoint/2015/10/main">
-  <p1510:revLst>
-    <p1510:client id="{ABAD35E0-20F2-924D-9CFF-DB760A0CF68F}" v="12" dt="2023-07-02T15:28:46.739"/>
-  </p1510:revLst>
-</p1510:revInfo>
-</file>
-
 <file path=ppt/changesInfos/changesInfo1.xml><?xml version="1.0" encoding="utf-8"?>
 <pc:chgInfo xmlns:a="http://schemas.openxmlformats.org/drawingml/2006/main" xmlns:r="http://schemas.openxmlformats.org/officeDocument/2006/relationships" xmlns:ac="http://schemas.microsoft.com/office/drawing/2013/main/command" xmlns:pc="http://schemas.microsoft.com/office/powerpoint/2013/main/command">
+  <pc:docChgLst>
+    <pc:chgData name="Ismaël Tuo" userId="fca7baf0e513a1e6" providerId="LiveId" clId="{B2DC9C37-1557-4A28-8AF3-3326FDF4E992}"/>
+    <pc:docChg chg="modSld">
+      <pc:chgData name="Ismaël Tuo" userId="fca7baf0e513a1e6" providerId="LiveId" clId="{B2DC9C37-1557-4A28-8AF3-3326FDF4E992}" dt="2024-01-14T11:33:15.856" v="1" actId="113"/>
+      <pc:docMkLst>
+        <pc:docMk/>
+      </pc:docMkLst>
+      <pc:sldChg chg="modSp mod">
+        <pc:chgData name="Ismaël Tuo" userId="fca7baf0e513a1e6" providerId="LiveId" clId="{B2DC9C37-1557-4A28-8AF3-3326FDF4E992}" dt="2024-01-14T11:33:12.076" v="0" actId="113"/>
+        <pc:sldMkLst>
+          <pc:docMk/>
+          <pc:sldMk cId="1268069196" sldId="285"/>
+        </pc:sldMkLst>
+        <pc:spChg chg="mod">
+          <ac:chgData name="Ismaël Tuo" userId="fca7baf0e513a1e6" providerId="LiveId" clId="{B2DC9C37-1557-4A28-8AF3-3326FDF4E992}" dt="2024-01-14T11:33:12.076" v="0" actId="113"/>
+          <ac:spMkLst>
+            <pc:docMk/>
+            <pc:sldMk cId="1268069196" sldId="285"/>
+            <ac:spMk id="6" creationId="{84F10693-2FE8-EFC8-8DB6-84BFD181D260}"/>
+          </ac:spMkLst>
+        </pc:spChg>
+      </pc:sldChg>
+      <pc:sldChg chg="modSp mod">
+        <pc:chgData name="Ismaël Tuo" userId="fca7baf0e513a1e6" providerId="LiveId" clId="{B2DC9C37-1557-4A28-8AF3-3326FDF4E992}" dt="2024-01-14T11:33:15.856" v="1" actId="113"/>
+        <pc:sldMkLst>
+          <pc:docMk/>
+          <pc:sldMk cId="2639441608" sldId="286"/>
+        </pc:sldMkLst>
+        <pc:spChg chg="mod">
+          <ac:chgData name="Ismaël Tuo" userId="fca7baf0e513a1e6" providerId="LiveId" clId="{B2DC9C37-1557-4A28-8AF3-3326FDF4E992}" dt="2024-01-14T11:33:15.856" v="1" actId="113"/>
+          <ac:spMkLst>
+            <pc:docMk/>
+            <pc:sldMk cId="2639441608" sldId="286"/>
+            <ac:spMk id="6" creationId="{84F10693-2FE8-EFC8-8DB6-84BFD181D260}"/>
+          </ac:spMkLst>
+        </pc:spChg>
+      </pc:sldChg>
+    </pc:docChg>
+  </pc:docChgLst>
   <pc:docChgLst>
     <pc:chgData name="Ismaël Tuo" userId="fca7baf0e513a1e6" providerId="LiveId" clId="{ABAD35E0-20F2-924D-9CFF-DB760A0CF68F}"/>
     <pc:docChg chg="custSel addSld delSld modSld">
@@ -369,7 +400,7 @@
           <a:p>
             <a:fld id="{5D1B8971-FAD5-A544-A565-5C81831E2E08}" type="datetimeFigureOut">
               <a:rPr lang="fr-FR" smtClean="0"/>
-              <a:t>16/07/2023</a:t>
+              <a:t>14/01/2024</a:t>
             </a:fld>
             <a:endParaRPr lang="fr-FR"/>
           </a:p>
@@ -799,7 +830,7 @@
           <a:p>
             <a:fld id="{446AF453-C717-E044-9B61-C449088DBB9F}" type="datetime1">
               <a:rPr lang="fr-FR" smtClean="0"/>
-              <a:t>16/07/2023</a:t>
+              <a:t>14/01/2024</a:t>
             </a:fld>
             <a:endParaRPr lang="fr-FR"/>
           </a:p>
@@ -973,7 +1004,7 @@
           <a:p>
             <a:fld id="{0AD74B8B-4B66-A54B-A7E1-EB9F6C09CE67}" type="datetime1">
               <a:rPr lang="fr-FR" smtClean="0"/>
-              <a:t>16/07/2023</a:t>
+              <a:t>14/01/2024</a:t>
             </a:fld>
             <a:endParaRPr lang="fr-FR"/>
           </a:p>
@@ -1157,7 +1188,7 @@
           <a:p>
             <a:fld id="{9584F9F2-42A0-CD42-8013-986AEAF97421}" type="datetime1">
               <a:rPr lang="fr-FR" smtClean="0"/>
-              <a:t>16/07/2023</a:t>
+              <a:t>14/01/2024</a:t>
             </a:fld>
             <a:endParaRPr lang="fr-FR"/>
           </a:p>
@@ -1331,7 +1362,7 @@
           <a:p>
             <a:fld id="{DAB9BD9F-3179-BB4C-96AB-C40862581685}" type="datetime1">
               <a:rPr lang="fr-FR" smtClean="0"/>
-              <a:t>16/07/2023</a:t>
+              <a:t>14/01/2024</a:t>
             </a:fld>
             <a:endParaRPr lang="fr-FR"/>
           </a:p>
@@ -1603,7 +1634,7 @@
           <a:p>
             <a:fld id="{A664DE96-64FF-BC43-8A9C-18ED43A528D6}" type="datetime1">
               <a:rPr lang="fr-FR" smtClean="0"/>
-              <a:t>16/07/2023</a:t>
+              <a:t>14/01/2024</a:t>
             </a:fld>
             <a:endParaRPr lang="fr-FR"/>
           </a:p>
@@ -1839,7 +1870,7 @@
           <a:p>
             <a:fld id="{2C8FE800-9F9B-1C4F-A1CD-9EF46842C4CA}" type="datetime1">
               <a:rPr lang="fr-FR" smtClean="0"/>
-              <a:t>16/07/2023</a:t>
+              <a:t>14/01/2024</a:t>
             </a:fld>
             <a:endParaRPr lang="fr-FR"/>
           </a:p>
@@ -2202,7 +2233,7 @@
           <a:p>
             <a:fld id="{0F7DED4E-8CB4-EF40-A349-EFC02EC7784E}" type="datetime1">
               <a:rPr lang="fr-FR" smtClean="0"/>
-              <a:t>16/07/2023</a:t>
+              <a:t>14/01/2024</a:t>
             </a:fld>
             <a:endParaRPr lang="fr-FR"/>
           </a:p>
@@ -2347,7 +2378,7 @@
           <a:p>
             <a:fld id="{5BB88D77-E8A2-E24F-81D2-817E60779F3E}" type="datetime1">
               <a:rPr lang="fr-FR" smtClean="0"/>
-              <a:t>16/07/2023</a:t>
+              <a:t>14/01/2024</a:t>
             </a:fld>
             <a:endParaRPr lang="fr-FR"/>
           </a:p>
@@ -2446,7 +2477,7 @@
           <a:p>
             <a:fld id="{817F964E-5B57-884A-A1B8-925BFA5276AF}" type="datetime1">
               <a:rPr lang="fr-FR" smtClean="0"/>
-              <a:t>16/07/2023</a:t>
+              <a:t>14/01/2024</a:t>
             </a:fld>
             <a:endParaRPr lang="fr-FR"/>
           </a:p>
@@ -2807,7 +2838,7 @@
           <a:p>
             <a:fld id="{D5636CD0-A2E6-1543-A0E5-C829C16FEE55}" type="datetime1">
               <a:rPr lang="fr-FR" smtClean="0"/>
-              <a:t>16/07/2023</a:t>
+              <a:t>14/01/2024</a:t>
             </a:fld>
             <a:endParaRPr lang="fr-FR"/>
           </a:p>
@@ -3168,7 +3199,7 @@
           <a:p>
             <a:fld id="{CEE5CE4A-5B1A-1846-BA66-722BDB7A9525}" type="datetime1">
               <a:rPr lang="fr-FR" smtClean="0"/>
-              <a:t>16/07/2023</a:t>
+              <a:t>14/01/2024</a:t>
             </a:fld>
             <a:endParaRPr lang="fr-FR"/>
           </a:p>
@@ -3415,7 +3446,7 @@
           <a:p>
             <a:fld id="{55A13D9C-CA6E-9C45-8634-4423EBFFD553}" type="datetime1">
               <a:rPr lang="fr-FR" smtClean="0"/>
-              <a:t>16/07/2023</a:t>
+              <a:t>14/01/2024</a:t>
             </a:fld>
             <a:endParaRPr lang="fr-FR"/>
           </a:p>
@@ -4328,7 +4359,7 @@
           <a:lstStyle/>
           <a:p>
             <a:r>
-              <a:rPr lang="fr-FR" sz="2800" dirty="0">
+              <a:rPr lang="fr-FR" sz="2800" b="1" dirty="0">
                 <a:latin typeface="Times New Roman" panose="02020603050405020304" pitchFamily="18" charset="0"/>
                 <a:cs typeface="Times New Roman" panose="02020603050405020304" pitchFamily="18" charset="0"/>
               </a:rPr>
@@ -4535,7 +4566,7 @@
           <a:lstStyle/>
           <a:p>
             <a:r>
-              <a:rPr lang="fr-FR" sz="2400" dirty="0">
+              <a:rPr lang="fr-FR" sz="2400" b="1" dirty="0">
                 <a:latin typeface="Times New Roman" panose="02020603050405020304" pitchFamily="18" charset="0"/>
                 <a:cs typeface="Times New Roman" panose="02020603050405020304" pitchFamily="18" charset="0"/>
               </a:rPr>

</xml_diff>